<commit_message>
minor change plus pdf
</commit_message>
<xml_diff>
--- a/d3_presentation_pere.pptx
+++ b/d3_presentation_pere.pptx
@@ -4967,6 +4967,82 @@
           </a:p>
         </p:txBody>
       </p:sp>
+      <p:sp>
+        <p:nvSpPr>
+          <p:cNvPr id="6" name="Rectangle 5"/>
+          <p:cNvSpPr/>
+          <p:nvPr/>
+        </p:nvSpPr>
+        <p:spPr>
+          <a:xfrm>
+            <a:off x="2852689" y="5605041"/>
+            <a:ext cx="2852990" cy="369332"/>
+          </a:xfrm>
+          <a:prstGeom prst="rect">
+            <a:avLst/>
+          </a:prstGeom>
+        </p:spPr>
+        <p:txBody>
+          <a:bodyPr wrap="none">
+            <a:spAutoFit/>
+          </a:bodyPr>
+          <a:lstStyle/>
+          <a:p>
+            <a:pPr algn="r"/>
+            <a:r>
+              <a:rPr lang="en-US" dirty="0" smtClean="0">
+                <a:solidFill>
+                  <a:srgbClr val="7F7F7F"/>
+                </a:solidFill>
+                <a:latin typeface="Open Sans"/>
+                <a:cs typeface="Open Sans"/>
+                <a:hlinkClick r:id="rId3"/>
+              </a:rPr>
+              <a:t>http://</a:t>
+            </a:r>
+            <a:r>
+              <a:rPr lang="en-US" dirty="0" err="1" smtClean="0">
+                <a:solidFill>
+                  <a:srgbClr val="7F7F7F"/>
+                </a:solidFill>
+                <a:latin typeface="Open Sans"/>
+                <a:cs typeface="Open Sans"/>
+                <a:hlinkClick r:id="rId3"/>
+              </a:rPr>
+              <a:t>a</a:t>
+            </a:r>
+            <a:r>
+              <a:rPr lang="en-US" dirty="0" err="1" smtClean="0">
+                <a:solidFill>
+                  <a:srgbClr val="7F7F7F"/>
+                </a:solidFill>
+                <a:latin typeface="Open Sans"/>
+                <a:cs typeface="Open Sans"/>
+                <a:hlinkClick r:id="rId3"/>
+              </a:rPr>
+              <a:t>dampere.com</a:t>
+            </a:r>
+            <a:r>
+              <a:rPr lang="en-US" dirty="0" smtClean="0">
+                <a:solidFill>
+                  <a:srgbClr val="7F7F7F"/>
+                </a:solidFill>
+                <a:latin typeface="Open Sans"/>
+                <a:cs typeface="Open Sans"/>
+                <a:hlinkClick r:id="rId3"/>
+              </a:rPr>
+              <a:t>/d3</a:t>
+            </a:r>
+            <a:endParaRPr lang="en-US" dirty="0">
+              <a:solidFill>
+                <a:srgbClr val="7F7F7F"/>
+              </a:solidFill>
+              <a:latin typeface="Open Sans"/>
+              <a:cs typeface="Open Sans"/>
+            </a:endParaRPr>
+          </a:p>
+        </p:txBody>
+      </p:sp>
     </p:spTree>
     <p:extLst>
       <p:ext uri="{BB962C8B-B14F-4D97-AF65-F5344CB8AC3E}">
@@ -5364,6 +5440,7 @@
               <a:rPr lang="en-US" dirty="0" smtClean="0">
                 <a:latin typeface="Open Sans"/>
                 <a:cs typeface="Open Sans"/>
+                <a:hlinkClick r:id="rId4"/>
               </a:rPr>
               <a:t>link</a:t>
             </a:r>
@@ -5919,6 +5996,7 @@
               <a:rPr lang="en-US" dirty="0" smtClean="0">
                 <a:latin typeface="Open Sans"/>
                 <a:cs typeface="Open Sans"/>
+                <a:hlinkClick r:id="rId4"/>
               </a:rPr>
               <a:t>link</a:t>
             </a:r>
@@ -6391,6 +6469,7 @@
               <a:rPr lang="en-US" dirty="0" smtClean="0">
                 <a:latin typeface="Open Sans"/>
                 <a:cs typeface="Open Sans"/>
+                <a:hlinkClick r:id="rId4"/>
               </a:rPr>
               <a:t>link</a:t>
             </a:r>
@@ -6819,6 +6898,7 @@
               <a:rPr lang="en-US" dirty="0" smtClean="0">
                 <a:latin typeface="Open Sans"/>
                 <a:cs typeface="Open Sans"/>
+                <a:hlinkClick r:id="rId4"/>
               </a:rPr>
               <a:t>link</a:t>
             </a:r>
@@ -7178,6 +7258,7 @@
               <a:rPr lang="en-US" sz="3600" dirty="0" smtClean="0">
                 <a:latin typeface="Open Sans"/>
                 <a:cs typeface="Open Sans"/>
+                <a:hlinkClick r:id="rId4"/>
               </a:rPr>
               <a:t>Examples</a:t>
             </a:r>
@@ -7541,8 +7622,9 @@
               <a:rPr lang="en-US" dirty="0" err="1" smtClean="0">
                 <a:latin typeface="Open Sans"/>
                 <a:cs typeface="Open Sans"/>
-              </a:rPr>
-              <a:t>Tutorial.html</a:t>
+                <a:hlinkClick r:id="rId4"/>
+              </a:rPr>
+              <a:t>Instructions.html</a:t>
             </a:r>
             <a:endParaRPr lang="en-US" dirty="0">
               <a:latin typeface="Open Sans"/>
@@ -8544,12 +8626,19 @@
             <a:pPr algn="r"/>
             <a:r>
               <a:rPr lang="en-US" sz="3600" dirty="0" smtClean="0">
-                <a:latin typeface="Open Sans"/>
-                <a:cs typeface="Open Sans"/>
+                <a:solidFill>
+                  <a:srgbClr val="000000"/>
+                </a:solidFill>
+                <a:latin typeface="Open Sans"/>
+                <a:cs typeface="Open Sans"/>
+                <a:hlinkClick r:id="rId4"/>
               </a:rPr>
               <a:t>Examples</a:t>
             </a:r>
             <a:endParaRPr lang="en-US" sz="3600" dirty="0">
+              <a:solidFill>
+                <a:srgbClr val="000000"/>
+              </a:solidFill>
               <a:latin typeface="Open Sans"/>
               <a:cs typeface="Open Sans"/>
             </a:endParaRPr>
@@ -8847,6 +8936,7 @@
               <a:rPr lang="en-US" dirty="0" smtClean="0">
                 <a:latin typeface="Open Sans"/>
                 <a:cs typeface="Open Sans"/>
+                <a:hlinkClick r:id="rId3"/>
               </a:rPr>
               <a:t>link</a:t>
             </a:r>
@@ -9263,6 +9353,7 @@
               <a:rPr lang="en-US" dirty="0" smtClean="0">
                 <a:latin typeface="Open Sans"/>
                 <a:cs typeface="Open Sans"/>
+                <a:hlinkClick r:id="rId4"/>
               </a:rPr>
               <a:t>link</a:t>
             </a:r>
@@ -9798,6 +9889,7 @@
               <a:rPr lang="en-US" dirty="0" smtClean="0">
                 <a:latin typeface="Open Sans"/>
                 <a:cs typeface="Open Sans"/>
+                <a:hlinkClick r:id="rId4"/>
               </a:rPr>
               <a:t>link</a:t>
             </a:r>
@@ -10332,6 +10424,7 @@
               <a:rPr lang="en-US" dirty="0" smtClean="0">
                 <a:latin typeface="Open Sans"/>
                 <a:cs typeface="Open Sans"/>
+                <a:hlinkClick r:id="rId4"/>
               </a:rPr>
               <a:t>link</a:t>
             </a:r>
@@ -10365,7 +10458,7 @@
 <file path=ppt/theme/theme1.xml><?xml version="1.0" encoding="utf-8"?>
 <a:theme xmlns:a="http://schemas.openxmlformats.org/drawingml/2006/main" name="Office Theme">
   <a:themeElements>
-    <a:clrScheme name="Office">
+    <a:clrScheme name="Custom 1">
       <a:dk1>
         <a:sysClr val="windowText" lastClr="000000"/>
       </a:dk1>
@@ -10397,7 +10490,7 @@
         <a:srgbClr val="F79646"/>
       </a:accent6>
       <a:hlink>
-        <a:srgbClr val="0000FF"/>
+        <a:srgbClr val="000000"/>
       </a:hlink>
       <a:folHlink>
         <a:srgbClr val="800080"/>

</xml_diff>